<commit_message>
remove mention of final project groups
</commit_message>
<xml_diff>
--- a/s3/slides/s3.pptx
+++ b/s3/slides/s3.pptx
@@ -216,7 +216,7 @@
           <a:p>
             <a:fld id="{EBD6F028-2067-3740-AA48-A91E93570B1D}" type="datetimeFigureOut">
               <a:rPr lang="en-US" smtClean="0"/>
-              <a:t>10/4/20</a:t>
+              <a:t>10/11/21</a:t>
             </a:fld>
             <a:endParaRPr lang="en-US"/>
           </a:p>
@@ -1946,7 +1946,7 @@
 </file>
 
 <file path=ppt/slides/slide5.xml><?xml version="1.0" encoding="utf-8"?>
-<p:sld xmlns:a="http://schemas.openxmlformats.org/drawingml/2006/main" xmlns:r="http://schemas.openxmlformats.org/officeDocument/2006/relationships" xmlns:p="http://schemas.openxmlformats.org/presentationml/2006/main">
+<p:sld xmlns:a="http://schemas.openxmlformats.org/drawingml/2006/main" xmlns:r="http://schemas.openxmlformats.org/officeDocument/2006/relationships" xmlns:p="http://schemas.openxmlformats.org/presentationml/2006/main" show="0">
   <p:cSld>
     <p:spTree>
       <p:nvGrpSpPr>

</xml_diff>